<commit_message>
fix typos, cleanup proposal presentation
</commit_message>
<xml_diff>
--- a/doc/proposal/thesis2015-proposal.pptx
+++ b/doc/proposal/thesis2015-proposal.pptx
@@ -4111,7 +4111,7 @@
             </a:r>
             <a:r>
               <a:rPr lang="en-US" dirty="0" smtClean="0"/>
-              <a:t>compare to ideal models</a:t>
+              <a:t>compare parts to ideal models</a:t>
             </a:r>
           </a:p>
           <a:p>
@@ -4491,7 +4491,7 @@
         <p:spPr>
           <a:xfrm>
             <a:off x="6648450" y="4264223"/>
-            <a:ext cx="2057400" cy="307777"/>
+            <a:ext cx="2057400" cy="523220"/>
           </a:xfrm>
           <a:prstGeom prst="rect">
             <a:avLst/>
@@ -4506,8 +4506,19 @@
           <a:p>
             <a:pPr algn="ctr"/>
             <a:r>
+              <a:rPr lang="en-US" sz="1400" i="1" dirty="0" smtClean="0"/>
+              <a:t>Matterport </a:t>
+            </a:r>
+            <a:r>
               <a:rPr lang="en-US" sz="1400" dirty="0" smtClean="0"/>
-              <a:t>“Matterport” scanner</a:t>
+              <a:t>scanner:</a:t>
+            </a:r>
+          </a:p>
+          <a:p>
+            <a:pPr algn="ctr"/>
+            <a:r>
+              <a:rPr lang="en-US" sz="1400" dirty="0" smtClean="0"/>
+              <a:t>Carry a laptop around</a:t>
             </a:r>
           </a:p>
         </p:txBody>
@@ -4845,7 +4856,7 @@
           <a:p>
             <a:r>
               <a:rPr lang="en-US" dirty="0" smtClean="0"/>
-              <a:t>Lots of reserach </a:t>
+              <a:t>Lots of research </a:t>
             </a:r>
             <a:r>
               <a:rPr lang="en-US" b="1" dirty="0" smtClean="0"/>
@@ -4986,7 +4997,7 @@
           <a:p>
             <a:r>
               <a:rPr lang="en-US" dirty="0" smtClean="0"/>
-              <a:t>Lots of reserach </a:t>
+              <a:t>Lots of research </a:t>
             </a:r>
             <a:r>
               <a:rPr lang="en-US" b="1" dirty="0" smtClean="0"/>
@@ -5011,15 +5022,15 @@
             </a:r>
             <a:r>
               <a:rPr lang="en-US" dirty="0" smtClean="0"/>
-              <a:t>" by William Steptoe: capture video, display in Oculus for </a:t>
+              <a:t>" by William Steptoe: capture video, display in Oculus for ‘</a:t>
             </a:r>
             <a:r>
               <a:rPr lang="en-US" b="1" dirty="0" smtClean="0"/>
-              <a:t>‘see-through,’</a:t>
-            </a:r>
-            <a:r>
-              <a:rPr lang="en-US" dirty="0" smtClean="0"/>
-              <a:t> tracks hand markers</a:t>
+              <a:t>see-through</a:t>
+            </a:r>
+            <a:r>
+              <a:rPr lang="en-US" dirty="0" smtClean="0"/>
+              <a:t>,’ tracks hand markers</a:t>
             </a:r>
             <a:endParaRPr lang="en-US" b="1" dirty="0" smtClean="0"/>
           </a:p>
@@ -5165,7 +5176,7 @@
             </a:r>
             <a:r>
               <a:rPr lang="en-US" dirty="0" smtClean="0"/>
-              <a:t>with Oculus C API</a:t>
+              <a:t>using Oculus C API</a:t>
             </a:r>
           </a:p>
           <a:p>

</xml_diff>